<commit_message>
modif diapo du 25-01-23
</commit_message>
<xml_diff>
--- a/Rapport/Reflexion/Processus.pptx
+++ b/Rapport/Reflexion/Processus.pptx
@@ -108,6 +108,11 @@
       </a:defRPr>
     </a:lvl9pPr>
   </p:defaultTextStyle>
+  <p:extLst>
+    <p:ext uri="{EFAFB233-063F-42B5-8137-9DF3F51BA10A}">
+      <p15:sldGuideLst xmlns:p15="http://schemas.microsoft.com/office/powerpoint/2012/main"/>
+    </p:ext>
+  </p:extLst>
 </p:presentation>
 </file>
 
@@ -258,7 +263,7 @@
           <a:p>
             <a:fld id="{9569DCF1-4D0C-4978-A5E8-F5438AB6F1E7}" type="datetimeFigureOut">
               <a:rPr lang="fr-FR" smtClean="0"/>
-              <a:t>24/01/2023</a:t>
+              <a:t>25/01/2023</a:t>
             </a:fld>
             <a:endParaRPr lang="fr-FR"/>
           </a:p>
@@ -456,7 +461,7 @@
           <a:p>
             <a:fld id="{9569DCF1-4D0C-4978-A5E8-F5438AB6F1E7}" type="datetimeFigureOut">
               <a:rPr lang="fr-FR" smtClean="0"/>
-              <a:t>24/01/2023</a:t>
+              <a:t>25/01/2023</a:t>
             </a:fld>
             <a:endParaRPr lang="fr-FR"/>
           </a:p>
@@ -664,7 +669,7 @@
           <a:p>
             <a:fld id="{9569DCF1-4D0C-4978-A5E8-F5438AB6F1E7}" type="datetimeFigureOut">
               <a:rPr lang="fr-FR" smtClean="0"/>
-              <a:t>24/01/2023</a:t>
+              <a:t>25/01/2023</a:t>
             </a:fld>
             <a:endParaRPr lang="fr-FR"/>
           </a:p>
@@ -862,7 +867,7 @@
           <a:p>
             <a:fld id="{9569DCF1-4D0C-4978-A5E8-F5438AB6F1E7}" type="datetimeFigureOut">
               <a:rPr lang="fr-FR" smtClean="0"/>
-              <a:t>24/01/2023</a:t>
+              <a:t>25/01/2023</a:t>
             </a:fld>
             <a:endParaRPr lang="fr-FR"/>
           </a:p>
@@ -1137,7 +1142,7 @@
           <a:p>
             <a:fld id="{9569DCF1-4D0C-4978-A5E8-F5438AB6F1E7}" type="datetimeFigureOut">
               <a:rPr lang="fr-FR" smtClean="0"/>
-              <a:t>24/01/2023</a:t>
+              <a:t>25/01/2023</a:t>
             </a:fld>
             <a:endParaRPr lang="fr-FR"/>
           </a:p>
@@ -1402,7 +1407,7 @@
           <a:p>
             <a:fld id="{9569DCF1-4D0C-4978-A5E8-F5438AB6F1E7}" type="datetimeFigureOut">
               <a:rPr lang="fr-FR" smtClean="0"/>
-              <a:t>24/01/2023</a:t>
+              <a:t>25/01/2023</a:t>
             </a:fld>
             <a:endParaRPr lang="fr-FR"/>
           </a:p>
@@ -1814,7 +1819,7 @@
           <a:p>
             <a:fld id="{9569DCF1-4D0C-4978-A5E8-F5438AB6F1E7}" type="datetimeFigureOut">
               <a:rPr lang="fr-FR" smtClean="0"/>
-              <a:t>24/01/2023</a:t>
+              <a:t>25/01/2023</a:t>
             </a:fld>
             <a:endParaRPr lang="fr-FR"/>
           </a:p>
@@ -1955,7 +1960,7 @@
           <a:p>
             <a:fld id="{9569DCF1-4D0C-4978-A5E8-F5438AB6F1E7}" type="datetimeFigureOut">
               <a:rPr lang="fr-FR" smtClean="0"/>
-              <a:t>24/01/2023</a:t>
+              <a:t>25/01/2023</a:t>
             </a:fld>
             <a:endParaRPr lang="fr-FR"/>
           </a:p>
@@ -2068,7 +2073,7 @@
           <a:p>
             <a:fld id="{9569DCF1-4D0C-4978-A5E8-F5438AB6F1E7}" type="datetimeFigureOut">
               <a:rPr lang="fr-FR" smtClean="0"/>
-              <a:t>24/01/2023</a:t>
+              <a:t>25/01/2023</a:t>
             </a:fld>
             <a:endParaRPr lang="fr-FR"/>
           </a:p>
@@ -2379,7 +2384,7 @@
           <a:p>
             <a:fld id="{9569DCF1-4D0C-4978-A5E8-F5438AB6F1E7}" type="datetimeFigureOut">
               <a:rPr lang="fr-FR" smtClean="0"/>
-              <a:t>24/01/2023</a:t>
+              <a:t>25/01/2023</a:t>
             </a:fld>
             <a:endParaRPr lang="fr-FR"/>
           </a:p>
@@ -2667,7 +2672,7 @@
           <a:p>
             <a:fld id="{9569DCF1-4D0C-4978-A5E8-F5438AB6F1E7}" type="datetimeFigureOut">
               <a:rPr lang="fr-FR" smtClean="0"/>
-              <a:t>24/01/2023</a:t>
+              <a:t>25/01/2023</a:t>
             </a:fld>
             <a:endParaRPr lang="fr-FR"/>
           </a:p>
@@ -2908,7 +2913,7 @@
           <a:p>
             <a:fld id="{9569DCF1-4D0C-4978-A5E8-F5438AB6F1E7}" type="datetimeFigureOut">
               <a:rPr lang="fr-FR" smtClean="0"/>
-              <a:t>24/01/2023</a:t>
+              <a:t>25/01/2023</a:t>
             </a:fld>
             <a:endParaRPr lang="fr-FR"/>
           </a:p>
@@ -4249,8 +4254,8 @@
           </a:p>
         </p:txBody>
       </p:sp>
-      <mc:AlternateContent xmlns:mc="http://schemas.openxmlformats.org/markup-compatibility/2006">
-        <mc:Choice xmlns:a14="http://schemas.microsoft.com/office/drawing/2010/main" Requires="a14">
+      <mc:AlternateContent xmlns:mc="http://schemas.openxmlformats.org/markup-compatibility/2006" xmlns:a14="http://schemas.microsoft.com/office/drawing/2010/main">
+        <mc:Choice Requires="a14">
           <p:sp>
             <p:nvSpPr>
               <p:cNvPr id="3" name="Espace réservé du contenu 2">
@@ -4953,7 +4958,7 @@
             </p:txBody>
           </p:sp>
         </mc:Choice>
-        <mc:Fallback>
+        <mc:Fallback xmlns="">
           <p:sp>
             <p:nvSpPr>
               <p:cNvPr id="3" name="Espace réservé du contenu 2">
@@ -5634,6 +5639,259 @@
               </a:rPr>
               <a:t>Si t &gt; temps</a:t>
             </a:r>
+          </a:p>
+        </p:txBody>
+      </p:sp>
+      <p:sp>
+        <p:nvSpPr>
+          <p:cNvPr id="14" name="ZoneTexte 13">
+            <a:extLst>
+              <a:ext uri="{FF2B5EF4-FFF2-40B4-BE49-F238E27FC236}">
+                <a16:creationId xmlns:a16="http://schemas.microsoft.com/office/drawing/2014/main" id="{72D7700B-0A2F-9D76-9B92-CC27FA4B5FC3}"/>
+              </a:ext>
+            </a:extLst>
+          </p:cNvPr>
+          <p:cNvSpPr txBox="1"/>
+          <p:nvPr/>
+        </p:nvSpPr>
+        <p:spPr>
+          <a:xfrm>
+            <a:off x="2774982" y="2300371"/>
+            <a:ext cx="919163" cy="369332"/>
+          </a:xfrm>
+          <a:prstGeom prst="rect">
+            <a:avLst/>
+          </a:prstGeom>
+          <a:noFill/>
+        </p:spPr>
+        <p:txBody>
+          <a:bodyPr wrap="square">
+            <a:spAutoFit/>
+          </a:bodyPr>
+          <a:lstStyle/>
+          <a:p>
+            <a:r>
+              <a:rPr lang="fr-FR" i="1" dirty="0">
+                <a:solidFill>
+                  <a:schemeClr val="accent1"/>
+                </a:solidFill>
+              </a:rPr>
+              <a:t>Créer</a:t>
+            </a:r>
+            <a:endParaRPr lang="fr-FR" dirty="0"/>
+          </a:p>
+        </p:txBody>
+      </p:sp>
+      <p:sp>
+        <p:nvSpPr>
+          <p:cNvPr id="16" name="Forme libre : forme 15">
+            <a:extLst>
+              <a:ext uri="{FF2B5EF4-FFF2-40B4-BE49-F238E27FC236}">
+                <a16:creationId xmlns:a16="http://schemas.microsoft.com/office/drawing/2014/main" id="{5D19EA29-9AB9-59D8-FE43-2917E7F995D1}"/>
+              </a:ext>
+            </a:extLst>
+          </p:cNvPr>
+          <p:cNvSpPr/>
+          <p:nvPr/>
+        </p:nvSpPr>
+        <p:spPr>
+          <a:xfrm rot="10800000">
+            <a:off x="1899805" y="3024447"/>
+            <a:ext cx="5338618" cy="2400250"/>
+          </a:xfrm>
+          <a:custGeom>
+            <a:avLst/>
+            <a:gdLst>
+              <a:gd name="connsiteX0" fmla="*/ 5338618 w 5338618"/>
+              <a:gd name="connsiteY0" fmla="*/ 665018 h 665018"/>
+              <a:gd name="connsiteX1" fmla="*/ 5338618 w 5338618"/>
+              <a:gd name="connsiteY1" fmla="*/ 0 h 665018"/>
+              <a:gd name="connsiteX2" fmla="*/ 0 w 5338618"/>
+              <a:gd name="connsiteY2" fmla="*/ 18473 h 665018"/>
+              <a:gd name="connsiteX3" fmla="*/ 18473 w 5338618"/>
+              <a:gd name="connsiteY3" fmla="*/ 609600 h 665018"/>
+            </a:gdLst>
+            <a:ahLst/>
+            <a:cxnLst>
+              <a:cxn ang="0">
+                <a:pos x="connsiteX0" y="connsiteY0"/>
+              </a:cxn>
+              <a:cxn ang="0">
+                <a:pos x="connsiteX1" y="connsiteY1"/>
+              </a:cxn>
+              <a:cxn ang="0">
+                <a:pos x="connsiteX2" y="connsiteY2"/>
+              </a:cxn>
+              <a:cxn ang="0">
+                <a:pos x="connsiteX3" y="connsiteY3"/>
+              </a:cxn>
+            </a:cxnLst>
+            <a:rect l="l" t="t" r="r" b="b"/>
+            <a:pathLst>
+              <a:path w="5338618" h="665018">
+                <a:moveTo>
+                  <a:pt x="5338618" y="665018"/>
+                </a:moveTo>
+                <a:lnTo>
+                  <a:pt x="5338618" y="0"/>
+                </a:lnTo>
+                <a:lnTo>
+                  <a:pt x="0" y="18473"/>
+                </a:lnTo>
+                <a:lnTo>
+                  <a:pt x="18473" y="609600"/>
+                </a:lnTo>
+              </a:path>
+            </a:pathLst>
+          </a:custGeom>
+          <a:noFill/>
+          <a:ln w="38100">
+            <a:solidFill>
+              <a:schemeClr val="accent1"/>
+            </a:solidFill>
+            <a:prstDash val="sysDash"/>
+            <a:headEnd type="none" w="med" len="med"/>
+            <a:tailEnd type="arrow" w="med" len="med"/>
+          </a:ln>
+        </p:spPr>
+        <p:style>
+          <a:lnRef idx="2">
+            <a:schemeClr val="accent1">
+              <a:shade val="50000"/>
+            </a:schemeClr>
+          </a:lnRef>
+          <a:fillRef idx="1">
+            <a:schemeClr val="accent1"/>
+          </a:fillRef>
+          <a:effectRef idx="0">
+            <a:schemeClr val="accent1"/>
+          </a:effectRef>
+          <a:fontRef idx="minor">
+            <a:schemeClr val="lt1"/>
+          </a:fontRef>
+        </p:style>
+        <p:txBody>
+          <a:bodyPr rtlCol="0" anchor="ctr"/>
+          <a:lstStyle/>
+          <a:p>
+            <a:pPr algn="ctr"/>
+            <a:endParaRPr lang="fr-FR"/>
+          </a:p>
+        </p:txBody>
+      </p:sp>
+      <p:sp>
+        <p:nvSpPr>
+          <p:cNvPr id="3" name="Rectangle 2">
+            <a:extLst>
+              <a:ext uri="{FF2B5EF4-FFF2-40B4-BE49-F238E27FC236}">
+                <a16:creationId xmlns:a16="http://schemas.microsoft.com/office/drawing/2014/main" id="{A52C75C2-2498-3C5A-5E76-3B115B01FB78}"/>
+              </a:ext>
+            </a:extLst>
+          </p:cNvPr>
+          <p:cNvSpPr/>
+          <p:nvPr/>
+        </p:nvSpPr>
+        <p:spPr>
+          <a:xfrm>
+            <a:off x="908877" y="3042763"/>
+            <a:ext cx="1800000" cy="1029835"/>
+          </a:xfrm>
+          <a:prstGeom prst="rect">
+            <a:avLst/>
+          </a:prstGeom>
+          <a:solidFill>
+            <a:schemeClr val="bg1"/>
+          </a:solidFill>
+        </p:spPr>
+        <p:style>
+          <a:lnRef idx="2">
+            <a:schemeClr val="accent1"/>
+          </a:lnRef>
+          <a:fillRef idx="1">
+            <a:schemeClr val="lt1"/>
+          </a:fillRef>
+          <a:effectRef idx="0">
+            <a:schemeClr val="accent1"/>
+          </a:effectRef>
+          <a:fontRef idx="minor">
+            <a:schemeClr val="dk1"/>
+          </a:fontRef>
+        </p:style>
+        <p:txBody>
+          <a:bodyPr rtlCol="0" anchor="ctr"/>
+          <a:lstStyle/>
+          <a:p>
+            <a:pPr algn="ctr"/>
+            <a:r>
+              <a:rPr lang="fr-FR" i="1" dirty="0">
+                <a:solidFill>
+                  <a:schemeClr val="accent1"/>
+                </a:solidFill>
+              </a:rPr>
+              <a:t>Rejoindre</a:t>
+            </a:r>
+          </a:p>
+          <a:p>
+            <a:pPr algn="ctr"/>
+            <a:r>
+              <a:rPr lang="fr-FR" i="1" dirty="0">
+                <a:solidFill>
+                  <a:schemeClr val="accent1"/>
+                </a:solidFill>
+              </a:rPr>
+              <a:t>ou </a:t>
+            </a:r>
+          </a:p>
+          <a:p>
+            <a:pPr algn="ctr"/>
+            <a:r>
+              <a:rPr lang="fr-FR" i="1" dirty="0">
+                <a:solidFill>
+                  <a:schemeClr val="accent1"/>
+                </a:solidFill>
+              </a:rPr>
+              <a:t>Créer</a:t>
+            </a:r>
+          </a:p>
+        </p:txBody>
+      </p:sp>
+      <p:sp>
+        <p:nvSpPr>
+          <p:cNvPr id="18" name="ZoneTexte 17">
+            <a:extLst>
+              <a:ext uri="{FF2B5EF4-FFF2-40B4-BE49-F238E27FC236}">
+                <a16:creationId xmlns:a16="http://schemas.microsoft.com/office/drawing/2014/main" id="{A6D78C5F-1903-AFE5-1C28-D0378DAC0EC6}"/>
+              </a:ext>
+            </a:extLst>
+          </p:cNvPr>
+          <p:cNvSpPr txBox="1"/>
+          <p:nvPr/>
+        </p:nvSpPr>
+        <p:spPr>
+          <a:xfrm>
+            <a:off x="3472873" y="5452540"/>
+            <a:ext cx="6096000" cy="369332"/>
+          </a:xfrm>
+          <a:prstGeom prst="rect">
+            <a:avLst/>
+          </a:prstGeom>
+          <a:noFill/>
+        </p:spPr>
+        <p:txBody>
+          <a:bodyPr wrap="square">
+            <a:spAutoFit/>
+          </a:bodyPr>
+          <a:lstStyle/>
+          <a:p>
+            <a:r>
+              <a:rPr lang="fr-FR" i="1" dirty="0">
+                <a:solidFill>
+                  <a:schemeClr val="accent1"/>
+                </a:solidFill>
+              </a:rPr>
+              <a:t>Rejoindre</a:t>
+            </a:r>
+            <a:endParaRPr lang="fr-FR" dirty="0"/>
           </a:p>
         </p:txBody>
       </p:sp>
@@ -6909,7 +7167,7 @@
               <a:pPr algn="ctr"/>
               <a:r>
                 <a:rPr lang="fr-FR" sz="1200" dirty="0"/>
-                <a:t>Revanche</a:t>
+                <a:t>Rejouer ?</a:t>
               </a:r>
             </a:p>
           </p:txBody>

</xml_diff>